<commit_message>
"Link to github added"
</commit_message>
<xml_diff>
--- a/Telecomunicaciones/CallMeMaybe.pptx
+++ b/Telecomunicaciones/CallMeMaybe.pptx
@@ -112,6 +112,11 @@
       </a:defRPr>
     </a:lvl9pPr>
   </p:defaultTextStyle>
+  <p:extLst>
+    <p:ext uri="{EFAFB233-063F-42B5-8137-9DF3F51BA10A}">
+      <p15:sldGuideLst xmlns:p15="http://schemas.microsoft.com/office/powerpoint/2012/main"/>
+    </p:ext>
+  </p:extLst>
 </p:presentation>
 </file>
 
@@ -300,7 +305,7 @@
           <a:p>
             <a:fld id="{83284890-85D2-4D7B-8EF5-15A9C1DB8F42}" type="datetimeFigureOut">
               <a:rPr lang="en-US" smtClean="0"/>
-              <a:t>10/29/2024</a:t>
+              <a:t>10/30/2024</a:t>
             </a:fld>
             <a:endParaRPr lang="en-US" dirty="0"/>
           </a:p>
@@ -599,7 +604,7 @@
           <a:p>
             <a:fld id="{8664C608-40B1-4030-A28D-5B74BC98ADCE}" type="datetimeFigureOut">
               <a:rPr lang="en-US" smtClean="0"/>
-              <a:t>10/29/2024</a:t>
+              <a:t>10/30/2024</a:t>
             </a:fld>
             <a:endParaRPr lang="en-US" dirty="0"/>
           </a:p>
@@ -793,7 +798,7 @@
           <a:p>
             <a:fld id="{8664C608-40B1-4030-A28D-5B74BC98ADCE}" type="datetimeFigureOut">
               <a:rPr lang="en-US" smtClean="0"/>
-              <a:t>10/29/2024</a:t>
+              <a:t>10/30/2024</a:t>
             </a:fld>
             <a:endParaRPr lang="en-US" dirty="0"/>
           </a:p>
@@ -1056,7 +1061,7 @@
           <a:p>
             <a:fld id="{8664C608-40B1-4030-A28D-5B74BC98ADCE}" type="datetimeFigureOut">
               <a:rPr lang="en-US" smtClean="0"/>
-              <a:t>10/29/2024</a:t>
+              <a:t>10/30/2024</a:t>
             </a:fld>
             <a:endParaRPr lang="en-US" dirty="0"/>
           </a:p>
@@ -1482,7 +1487,7 @@
           <a:p>
             <a:fld id="{8664C608-40B1-4030-A28D-5B74BC98ADCE}" type="datetimeFigureOut">
               <a:rPr lang="en-US" smtClean="0"/>
-              <a:t>10/29/2024</a:t>
+              <a:t>10/30/2024</a:t>
             </a:fld>
             <a:endParaRPr lang="en-US" dirty="0"/>
           </a:p>
@@ -2021,7 +2026,7 @@
           <a:p>
             <a:fld id="{8664C608-40B1-4030-A28D-5B74BC98ADCE}" type="datetimeFigureOut">
               <a:rPr lang="en-US" smtClean="0"/>
-              <a:t>10/29/2024</a:t>
+              <a:t>10/30/2024</a:t>
             </a:fld>
             <a:endParaRPr lang="en-US" dirty="0"/>
           </a:p>
@@ -2887,7 +2892,7 @@
           <a:p>
             <a:fld id="{8664C608-40B1-4030-A28D-5B74BC98ADCE}" type="datetimeFigureOut">
               <a:rPr lang="en-US" smtClean="0"/>
-              <a:t>10/29/2024</a:t>
+              <a:t>10/30/2024</a:t>
             </a:fld>
             <a:endParaRPr lang="en-US" dirty="0"/>
           </a:p>
@@ -3059,7 +3064,7 @@
           <a:p>
             <a:fld id="{87157CC2-0FC8-4686-B024-99790E0F5162}" type="datetimeFigureOut">
               <a:rPr lang="en-US" smtClean="0"/>
-              <a:t>10/29/2024</a:t>
+              <a:t>10/30/2024</a:t>
             </a:fld>
             <a:endParaRPr lang="en-US" dirty="0"/>
           </a:p>
@@ -3243,7 +3248,7 @@
           <a:p>
             <a:fld id="{F6764DA5-CD3D-4590-A511-FCD3BC7A793E}" type="datetimeFigureOut">
               <a:rPr lang="en-US" smtClean="0"/>
-              <a:t>10/29/2024</a:t>
+              <a:t>10/30/2024</a:t>
             </a:fld>
             <a:endParaRPr lang="en-US" dirty="0"/>
           </a:p>
@@ -3413,7 +3418,7 @@
           <a:p>
             <a:fld id="{82F5661D-6934-4B32-B92C-470368BF1EC6}" type="datetimeFigureOut">
               <a:rPr lang="en-US" smtClean="0"/>
-              <a:t>10/29/2024</a:t>
+              <a:t>10/30/2024</a:t>
             </a:fld>
             <a:endParaRPr lang="en-US" dirty="0"/>
           </a:p>
@@ -3657,7 +3662,7 @@
           <a:p>
             <a:fld id="{C6F822A4-8DA6-4447-9B1F-C5DB58435268}" type="datetimeFigureOut">
               <a:rPr lang="en-US" smtClean="0"/>
-              <a:t>10/29/2024</a:t>
+              <a:t>10/30/2024</a:t>
             </a:fld>
             <a:endParaRPr lang="en-US" dirty="0"/>
           </a:p>
@@ -3894,7 +3899,7 @@
           <a:p>
             <a:fld id="{E548D31E-DCDA-41A7-9C67-C4B11B94D21D}" type="datetimeFigureOut">
               <a:rPr lang="en-US" smtClean="0"/>
-              <a:t>10/29/2024</a:t>
+              <a:t>10/30/2024</a:t>
             </a:fld>
             <a:endParaRPr lang="en-US" dirty="0"/>
           </a:p>
@@ -4360,7 +4365,7 @@
           <a:p>
             <a:fld id="{9B3762C0-B258-48F1-ADE6-176B4174CCDD}" type="datetimeFigureOut">
               <a:rPr lang="en-US" smtClean="0"/>
-              <a:t>10/29/2024</a:t>
+              <a:t>10/30/2024</a:t>
             </a:fld>
             <a:endParaRPr lang="en-US" dirty="0"/>
           </a:p>
@@ -4478,7 +4483,7 @@
           <a:p>
             <a:fld id="{677919A6-33EB-49BD-A62F-1FA56B9F9712}" type="datetimeFigureOut">
               <a:rPr lang="en-US" smtClean="0"/>
-              <a:t>10/29/2024</a:t>
+              <a:t>10/30/2024</a:t>
             </a:fld>
             <a:endParaRPr lang="en-US" dirty="0"/>
           </a:p>
@@ -4573,7 +4578,7 @@
           <a:p>
             <a:fld id="{CA4E7D1B-D673-4CF6-8672-009D42ABD2A0}" type="datetimeFigureOut">
               <a:rPr lang="en-US" smtClean="0"/>
-              <a:t>10/29/2024</a:t>
+              <a:t>10/30/2024</a:t>
             </a:fld>
             <a:endParaRPr lang="en-US" dirty="0"/>
           </a:p>
@@ -4828,7 +4833,7 @@
           <a:p>
             <a:fld id="{DA16AA21-1863-4931-97CB-99D0A168701B}" type="datetimeFigureOut">
               <a:rPr lang="en-US" smtClean="0"/>
-              <a:t>10/29/2024</a:t>
+              <a:t>10/30/2024</a:t>
             </a:fld>
             <a:endParaRPr lang="en-US" dirty="0"/>
           </a:p>
@@ -5128,7 +5133,7 @@
           <a:p>
             <a:fld id="{3772C379-9A7C-4C87-A116-CBE9F58B04C5}" type="datetimeFigureOut">
               <a:rPr lang="en-US" smtClean="0"/>
-              <a:t>10/29/2024</a:t>
+              <a:t>10/30/2024</a:t>
             </a:fld>
             <a:endParaRPr lang="en-US" dirty="0"/>
           </a:p>
@@ -5362,7 +5367,7 @@
           <a:p>
             <a:fld id="{8664C608-40B1-4030-A28D-5B74BC98ADCE}" type="datetimeFigureOut">
               <a:rPr lang="en-US" smtClean="0"/>
-              <a:t>10/29/2024</a:t>
+              <a:t>10/30/2024</a:t>
             </a:fld>
             <a:endParaRPr lang="en-US" dirty="0"/>
           </a:p>
@@ -6088,6 +6093,21 @@
             </a:r>
             <a:endParaRPr lang="es-MX" dirty="0"/>
           </a:p>
+          <a:p>
+            <a:r>
+              <a:rPr lang="es-MX" dirty="0">
+                <a:hlinkClick r:id="rId2"/>
+              </a:rPr>
+              <a:t>https://</a:t>
+            </a:r>
+            <a:r>
+              <a:rPr lang="es-MX" dirty="0" smtClean="0">
+                <a:hlinkClick r:id="rId2"/>
+              </a:rPr>
+              <a:t>github.com/UMonCar/Sprint_14_Final_Project</a:t>
+            </a:r>
+            <a:endParaRPr lang="es-MX" dirty="0"/>
+          </a:p>
         </p:txBody>
       </p:sp>
     </p:spTree>

</xml_diff>

<commit_message>
"Telecomunicaciones corrections & README file updates"
</commit_message>
<xml_diff>
--- a/Telecomunicaciones/CallMeMaybe.pptx
+++ b/Telecomunicaciones/CallMeMaybe.pptx
@@ -305,7 +305,7 @@
           <a:p>
             <a:fld id="{83284890-85D2-4D7B-8EF5-15A9C1DB8F42}" type="datetimeFigureOut">
               <a:rPr lang="en-US" smtClean="0"/>
-              <a:t>10/30/2024</a:t>
+              <a:t>11/2/2024</a:t>
             </a:fld>
             <a:endParaRPr lang="en-US" dirty="0"/>
           </a:p>
@@ -604,7 +604,7 @@
           <a:p>
             <a:fld id="{8664C608-40B1-4030-A28D-5B74BC98ADCE}" type="datetimeFigureOut">
               <a:rPr lang="en-US" smtClean="0"/>
-              <a:t>10/30/2024</a:t>
+              <a:t>11/2/2024</a:t>
             </a:fld>
             <a:endParaRPr lang="en-US" dirty="0"/>
           </a:p>
@@ -798,7 +798,7 @@
           <a:p>
             <a:fld id="{8664C608-40B1-4030-A28D-5B74BC98ADCE}" type="datetimeFigureOut">
               <a:rPr lang="en-US" smtClean="0"/>
-              <a:t>10/30/2024</a:t>
+              <a:t>11/2/2024</a:t>
             </a:fld>
             <a:endParaRPr lang="en-US" dirty="0"/>
           </a:p>
@@ -1061,7 +1061,7 @@
           <a:p>
             <a:fld id="{8664C608-40B1-4030-A28D-5B74BC98ADCE}" type="datetimeFigureOut">
               <a:rPr lang="en-US" smtClean="0"/>
-              <a:t>10/30/2024</a:t>
+              <a:t>11/2/2024</a:t>
             </a:fld>
             <a:endParaRPr lang="en-US" dirty="0"/>
           </a:p>
@@ -1487,7 +1487,7 @@
           <a:p>
             <a:fld id="{8664C608-40B1-4030-A28D-5B74BC98ADCE}" type="datetimeFigureOut">
               <a:rPr lang="en-US" smtClean="0"/>
-              <a:t>10/30/2024</a:t>
+              <a:t>11/2/2024</a:t>
             </a:fld>
             <a:endParaRPr lang="en-US" dirty="0"/>
           </a:p>
@@ -2026,7 +2026,7 @@
           <a:p>
             <a:fld id="{8664C608-40B1-4030-A28D-5B74BC98ADCE}" type="datetimeFigureOut">
               <a:rPr lang="en-US" smtClean="0"/>
-              <a:t>10/30/2024</a:t>
+              <a:t>11/2/2024</a:t>
             </a:fld>
             <a:endParaRPr lang="en-US" dirty="0"/>
           </a:p>
@@ -2892,7 +2892,7 @@
           <a:p>
             <a:fld id="{8664C608-40B1-4030-A28D-5B74BC98ADCE}" type="datetimeFigureOut">
               <a:rPr lang="en-US" smtClean="0"/>
-              <a:t>10/30/2024</a:t>
+              <a:t>11/2/2024</a:t>
             </a:fld>
             <a:endParaRPr lang="en-US" dirty="0"/>
           </a:p>
@@ -3064,7 +3064,7 @@
           <a:p>
             <a:fld id="{87157CC2-0FC8-4686-B024-99790E0F5162}" type="datetimeFigureOut">
               <a:rPr lang="en-US" smtClean="0"/>
-              <a:t>10/30/2024</a:t>
+              <a:t>11/2/2024</a:t>
             </a:fld>
             <a:endParaRPr lang="en-US" dirty="0"/>
           </a:p>
@@ -3248,7 +3248,7 @@
           <a:p>
             <a:fld id="{F6764DA5-CD3D-4590-A511-FCD3BC7A793E}" type="datetimeFigureOut">
               <a:rPr lang="en-US" smtClean="0"/>
-              <a:t>10/30/2024</a:t>
+              <a:t>11/2/2024</a:t>
             </a:fld>
             <a:endParaRPr lang="en-US" dirty="0"/>
           </a:p>
@@ -3418,7 +3418,7 @@
           <a:p>
             <a:fld id="{82F5661D-6934-4B32-B92C-470368BF1EC6}" type="datetimeFigureOut">
               <a:rPr lang="en-US" smtClean="0"/>
-              <a:t>10/30/2024</a:t>
+              <a:t>11/2/2024</a:t>
             </a:fld>
             <a:endParaRPr lang="en-US" dirty="0"/>
           </a:p>
@@ -3662,7 +3662,7 @@
           <a:p>
             <a:fld id="{C6F822A4-8DA6-4447-9B1F-C5DB58435268}" type="datetimeFigureOut">
               <a:rPr lang="en-US" smtClean="0"/>
-              <a:t>10/30/2024</a:t>
+              <a:t>11/2/2024</a:t>
             </a:fld>
             <a:endParaRPr lang="en-US" dirty="0"/>
           </a:p>
@@ -3899,7 +3899,7 @@
           <a:p>
             <a:fld id="{E548D31E-DCDA-41A7-9C67-C4B11B94D21D}" type="datetimeFigureOut">
               <a:rPr lang="en-US" smtClean="0"/>
-              <a:t>10/30/2024</a:t>
+              <a:t>11/2/2024</a:t>
             </a:fld>
             <a:endParaRPr lang="en-US" dirty="0"/>
           </a:p>
@@ -4365,7 +4365,7 @@
           <a:p>
             <a:fld id="{9B3762C0-B258-48F1-ADE6-176B4174CCDD}" type="datetimeFigureOut">
               <a:rPr lang="en-US" smtClean="0"/>
-              <a:t>10/30/2024</a:t>
+              <a:t>11/2/2024</a:t>
             </a:fld>
             <a:endParaRPr lang="en-US" dirty="0"/>
           </a:p>
@@ -4483,7 +4483,7 @@
           <a:p>
             <a:fld id="{677919A6-33EB-49BD-A62F-1FA56B9F9712}" type="datetimeFigureOut">
               <a:rPr lang="en-US" smtClean="0"/>
-              <a:t>10/30/2024</a:t>
+              <a:t>11/2/2024</a:t>
             </a:fld>
             <a:endParaRPr lang="en-US" dirty="0"/>
           </a:p>
@@ -4578,7 +4578,7 @@
           <a:p>
             <a:fld id="{CA4E7D1B-D673-4CF6-8672-009D42ABD2A0}" type="datetimeFigureOut">
               <a:rPr lang="en-US" smtClean="0"/>
-              <a:t>10/30/2024</a:t>
+              <a:t>11/2/2024</a:t>
             </a:fld>
             <a:endParaRPr lang="en-US" dirty="0"/>
           </a:p>
@@ -4833,7 +4833,7 @@
           <a:p>
             <a:fld id="{DA16AA21-1863-4931-97CB-99D0A168701B}" type="datetimeFigureOut">
               <a:rPr lang="en-US" smtClean="0"/>
-              <a:t>10/30/2024</a:t>
+              <a:t>11/2/2024</a:t>
             </a:fld>
             <a:endParaRPr lang="en-US" dirty="0"/>
           </a:p>
@@ -5133,7 +5133,7 @@
           <a:p>
             <a:fld id="{3772C379-9A7C-4C87-A116-CBE9F58B04C5}" type="datetimeFigureOut">
               <a:rPr lang="en-US" smtClean="0"/>
-              <a:t>10/30/2024</a:t>
+              <a:t>11/2/2024</a:t>
             </a:fld>
             <a:endParaRPr lang="en-US" dirty="0"/>
           </a:p>
@@ -5367,7 +5367,7 @@
           <a:p>
             <a:fld id="{8664C608-40B1-4030-A28D-5B74BC98ADCE}" type="datetimeFigureOut">
               <a:rPr lang="en-US" smtClean="0"/>
-              <a:t>10/30/2024</a:t>
+              <a:t>11/2/2024</a:t>
             </a:fld>
             <a:endParaRPr lang="en-US" dirty="0"/>
           </a:p>
@@ -7482,27 +7482,8 @@
           <a:p>
             <a:r>
               <a:rPr lang="es-MX" dirty="0" smtClean="0"/>
-              <a:t>Prueba </a:t>
-            </a:r>
-            <a:r>
-              <a:rPr lang="es-MX" dirty="0"/>
-              <a:t>t para dos muestras </a:t>
-            </a:r>
-            <a:r>
-              <a:rPr lang="es-MX" dirty="0" smtClean="0"/>
-              <a:t>independientes</a:t>
-            </a:r>
-            <a:r>
-              <a:rPr lang="es-MX" dirty="0"/>
-              <a:t>.</a:t>
-            </a:r>
-          </a:p>
-          <a:p>
-            <a:r>
-              <a:rPr lang="es-MX" dirty="0" smtClean="0"/>
-              <a:t>ANOVA.</a:t>
-            </a:r>
-            <a:endParaRPr lang="es-MX" dirty="0"/>
+              <a:t>Prueba Mann-Whitney</a:t>
+            </a:r>
           </a:p>
           <a:p>
             <a:r>

</xml_diff>